<commit_message>
início da produção de slides sobre CMS
</commit_message>
<xml_diff>
--- a/HTML-introducao.pptx
+++ b/HTML-introducao.pptx
@@ -204,7 +204,7 @@
           <a:p>
             <a:fld id="{94D3EB41-CF60-4C9F-BD83-AE56FA0945EB}" type="datetimeFigureOut">
               <a:rPr lang="pt-BR" smtClean="0"/>
-              <a:t>08/05/2020</a:t>
+              <a:t>13/05/2020</a:t>
             </a:fld>
             <a:endParaRPr lang="pt-BR"/>
           </a:p>
@@ -362,7 +362,7 @@
           <a:p>
             <a:fld id="{020F486D-935E-4125-8FD7-C735663CC7DE}" type="slidenum">
               <a:rPr lang="pt-BR" smtClean="0"/>
-              <a:t>‹#›</a:t>
+              <a:t>‹nº›</a:t>
             </a:fld>
             <a:endParaRPr lang="pt-BR"/>
           </a:p>
@@ -1302,7 +1302,7 @@
           <a:p>
             <a:fld id="{9642BF85-54FF-46CE-B398-87F998CFD60B}" type="datetimeFigureOut">
               <a:rPr lang="pt-BR" smtClean="0"/>
-              <a:t>08/05/2020</a:t>
+              <a:t>13/05/2020</a:t>
             </a:fld>
             <a:endParaRPr lang="pt-BR"/>
           </a:p>
@@ -1344,7 +1344,7 @@
           <a:p>
             <a:fld id="{29185252-FBA3-417A-8652-C405B89605D8}" type="slidenum">
               <a:rPr lang="pt-BR" smtClean="0"/>
-              <a:t>‹#›</a:t>
+              <a:t>‹nº›</a:t>
             </a:fld>
             <a:endParaRPr lang="pt-BR"/>
           </a:p>
@@ -1470,7 +1470,7 @@
           <a:p>
             <a:fld id="{9642BF85-54FF-46CE-B398-87F998CFD60B}" type="datetimeFigureOut">
               <a:rPr lang="pt-BR" smtClean="0"/>
-              <a:t>08/05/2020</a:t>
+              <a:t>13/05/2020</a:t>
             </a:fld>
             <a:endParaRPr lang="pt-BR"/>
           </a:p>
@@ -1512,7 +1512,7 @@
           <a:p>
             <a:fld id="{29185252-FBA3-417A-8652-C405B89605D8}" type="slidenum">
               <a:rPr lang="pt-BR" smtClean="0"/>
-              <a:t>‹#›</a:t>
+              <a:t>‹nº›</a:t>
             </a:fld>
             <a:endParaRPr lang="pt-BR"/>
           </a:p>
@@ -1648,7 +1648,7 @@
           <a:p>
             <a:fld id="{9642BF85-54FF-46CE-B398-87F998CFD60B}" type="datetimeFigureOut">
               <a:rPr lang="pt-BR" smtClean="0"/>
-              <a:t>08/05/2020</a:t>
+              <a:t>13/05/2020</a:t>
             </a:fld>
             <a:endParaRPr lang="pt-BR"/>
           </a:p>
@@ -1690,7 +1690,7 @@
           <a:p>
             <a:fld id="{29185252-FBA3-417A-8652-C405B89605D8}" type="slidenum">
               <a:rPr lang="pt-BR" smtClean="0"/>
-              <a:t>‹#›</a:t>
+              <a:t>‹nº›</a:t>
             </a:fld>
             <a:endParaRPr lang="pt-BR"/>
           </a:p>
@@ -1985,7 +1985,7 @@
           <a:p>
             <a:fld id="{9642BF85-54FF-46CE-B398-87F998CFD60B}" type="datetimeFigureOut">
               <a:rPr lang="pt-BR" smtClean="0"/>
-              <a:t>08/05/2020</a:t>
+              <a:t>13/05/2020</a:t>
             </a:fld>
             <a:endParaRPr lang="pt-BR"/>
           </a:p>
@@ -2027,7 +2027,7 @@
           <a:p>
             <a:fld id="{29185252-FBA3-417A-8652-C405B89605D8}" type="slidenum">
               <a:rPr lang="pt-BR" smtClean="0"/>
-              <a:t>‹#›</a:t>
+              <a:t>‹nº›</a:t>
             </a:fld>
             <a:endParaRPr lang="pt-BR"/>
           </a:p>
@@ -2256,7 +2256,7 @@
           <a:p>
             <a:fld id="{9642BF85-54FF-46CE-B398-87F998CFD60B}" type="datetimeFigureOut">
               <a:rPr lang="pt-BR" smtClean="0"/>
-              <a:t>08/05/2020</a:t>
+              <a:t>13/05/2020</a:t>
             </a:fld>
             <a:endParaRPr lang="pt-BR"/>
           </a:p>
@@ -2298,7 +2298,7 @@
           <a:p>
             <a:fld id="{29185252-FBA3-417A-8652-C405B89605D8}" type="slidenum">
               <a:rPr lang="pt-BR" smtClean="0"/>
-              <a:t>‹#›</a:t>
+              <a:t>‹nº›</a:t>
             </a:fld>
             <a:endParaRPr lang="pt-BR"/>
           </a:p>
@@ -2502,7 +2502,7 @@
           <a:p>
             <a:fld id="{9642BF85-54FF-46CE-B398-87F998CFD60B}" type="datetimeFigureOut">
               <a:rPr lang="pt-BR" smtClean="0"/>
-              <a:t>08/05/2020</a:t>
+              <a:t>13/05/2020</a:t>
             </a:fld>
             <a:endParaRPr lang="pt-BR"/>
           </a:p>
@@ -2544,7 +2544,7 @@
           <a:p>
             <a:fld id="{29185252-FBA3-417A-8652-C405B89605D8}" type="slidenum">
               <a:rPr lang="pt-BR" smtClean="0"/>
-              <a:t>‹#›</a:t>
+              <a:t>‹nº›</a:t>
             </a:fld>
             <a:endParaRPr lang="pt-BR"/>
           </a:p>
@@ -2866,7 +2866,7 @@
           <a:p>
             <a:fld id="{9642BF85-54FF-46CE-B398-87F998CFD60B}" type="datetimeFigureOut">
               <a:rPr lang="pt-BR" smtClean="0"/>
-              <a:t>08/05/2020</a:t>
+              <a:t>13/05/2020</a:t>
             </a:fld>
             <a:endParaRPr lang="pt-BR"/>
           </a:p>
@@ -2908,7 +2908,7 @@
           <a:p>
             <a:fld id="{29185252-FBA3-417A-8652-C405B89605D8}" type="slidenum">
               <a:rPr lang="pt-BR" smtClean="0"/>
-              <a:t>‹#›</a:t>
+              <a:t>‹nº›</a:t>
             </a:fld>
             <a:endParaRPr lang="pt-BR"/>
           </a:p>
@@ -3000,7 +3000,7 @@
           <a:p>
             <a:fld id="{9642BF85-54FF-46CE-B398-87F998CFD60B}" type="datetimeFigureOut">
               <a:rPr lang="pt-BR" smtClean="0"/>
-              <a:t>08/05/2020</a:t>
+              <a:t>13/05/2020</a:t>
             </a:fld>
             <a:endParaRPr lang="pt-BR"/>
           </a:p>
@@ -3042,7 +3042,7 @@
           <a:p>
             <a:fld id="{29185252-FBA3-417A-8652-C405B89605D8}" type="slidenum">
               <a:rPr lang="pt-BR" smtClean="0"/>
-              <a:t>‹#›</a:t>
+              <a:t>‹nº›</a:t>
             </a:fld>
             <a:endParaRPr lang="pt-BR"/>
           </a:p>
@@ -3095,7 +3095,7 @@
           <a:p>
             <a:fld id="{9642BF85-54FF-46CE-B398-87F998CFD60B}" type="datetimeFigureOut">
               <a:rPr lang="pt-BR" smtClean="0"/>
-              <a:t>08/05/2020</a:t>
+              <a:t>13/05/2020</a:t>
             </a:fld>
             <a:endParaRPr lang="pt-BR"/>
           </a:p>
@@ -3137,7 +3137,7 @@
           <a:p>
             <a:fld id="{29185252-FBA3-417A-8652-C405B89605D8}" type="slidenum">
               <a:rPr lang="pt-BR" smtClean="0"/>
-              <a:t>‹#›</a:t>
+              <a:t>‹nº›</a:t>
             </a:fld>
             <a:endParaRPr lang="pt-BR"/>
           </a:p>
@@ -3370,7 +3370,7 @@
           <a:p>
             <a:fld id="{9642BF85-54FF-46CE-B398-87F998CFD60B}" type="datetimeFigureOut">
               <a:rPr lang="pt-BR" smtClean="0"/>
-              <a:t>08/05/2020</a:t>
+              <a:t>13/05/2020</a:t>
             </a:fld>
             <a:endParaRPr lang="pt-BR"/>
           </a:p>
@@ -3412,7 +3412,7 @@
           <a:p>
             <a:fld id="{29185252-FBA3-417A-8652-C405B89605D8}" type="slidenum">
               <a:rPr lang="pt-BR" smtClean="0"/>
-              <a:t>‹#›</a:t>
+              <a:t>‹nº›</a:t>
             </a:fld>
             <a:endParaRPr lang="pt-BR"/>
           </a:p>
@@ -3622,7 +3622,7 @@
           <a:p>
             <a:fld id="{9642BF85-54FF-46CE-B398-87F998CFD60B}" type="datetimeFigureOut">
               <a:rPr lang="pt-BR" smtClean="0"/>
-              <a:t>08/05/2020</a:t>
+              <a:t>13/05/2020</a:t>
             </a:fld>
             <a:endParaRPr lang="pt-BR"/>
           </a:p>
@@ -3664,7 +3664,7 @@
           <a:p>
             <a:fld id="{29185252-FBA3-417A-8652-C405B89605D8}" type="slidenum">
               <a:rPr lang="pt-BR" smtClean="0"/>
-              <a:t>‹#›</a:t>
+              <a:t>‹nº›</a:t>
             </a:fld>
             <a:endParaRPr lang="pt-BR"/>
           </a:p>
@@ -3842,7 +3842,7 @@
           <a:p>
             <a:fld id="{9642BF85-54FF-46CE-B398-87F998CFD60B}" type="datetimeFigureOut">
               <a:rPr lang="pt-BR" smtClean="0"/>
-              <a:t>08/05/2020</a:t>
+              <a:t>13/05/2020</a:t>
             </a:fld>
             <a:endParaRPr lang="pt-BR"/>
           </a:p>
@@ -3920,7 +3920,7 @@
           <a:p>
             <a:fld id="{29185252-FBA3-417A-8652-C405B89605D8}" type="slidenum">
               <a:rPr lang="pt-BR" smtClean="0"/>
-              <a:t>‹#›</a:t>
+              <a:t>‹nº›</a:t>
             </a:fld>
             <a:endParaRPr lang="pt-BR"/>
           </a:p>
@@ -4281,9 +4281,10 @@
           <a:lstStyle/>
           <a:p>
             <a:r>
-              <a:rPr lang="pt-BR" dirty="0"/>
+              <a:rPr lang="pt-BR"/>
               <a:t>HTML</a:t>
             </a:r>
+            <a:endParaRPr lang="pt-BR" dirty="0"/>
           </a:p>
         </p:txBody>
       </p:sp>

</xml_diff>